<commit_message>
slides2m transitions (I think)
</commit_message>
<xml_diff>
--- a/fall11/slidesF11/slides2m.pptx
+++ b/fall11/slidesF11/slides2m.pptx
@@ -8342,13 +8342,13 @@
   <p:clrMapOvr>
     <a:masterClrMapping/>
   </p:clrMapOvr>
-  <mc:AlternateContent xmlns:mc="http://schemas.openxmlformats.org/markup-compatibility/2006">
-    <mc:Choice xmlns:p14="http://schemas.microsoft.com/office/powerpoint/2010/main" Requires="p14">
+  <mc:AlternateContent xmlns:mc="http://schemas.openxmlformats.org/markup-compatibility/2006" xmlns:p14="http://schemas.microsoft.com/office/powerpoint/2010/main">
+    <mc:Choice Requires="p14">
       <p:transition spd="med" p14:dur="700">
         <p:fade/>
       </p:transition>
     </mc:Choice>
-    <mc:Fallback>
+    <mc:Fallback xmlns="">
       <p:transition xmlns:p14="http://schemas.microsoft.com/office/powerpoint/2010/main" spd="med">
         <p:fade/>
       </p:transition>
@@ -9437,6 +9437,18 @@
   <p:clrMapOvr>
     <a:masterClrMapping/>
   </p:clrMapOvr>
+  <mc:AlternateContent xmlns:mc="http://schemas.openxmlformats.org/markup-compatibility/2006">
+    <mc:Choice xmlns:p14="http://schemas.microsoft.com/office/powerpoint/2010/main" Requires="p14">
+      <p:transition spd="med" p14:dur="700">
+        <p:fade/>
+      </p:transition>
+    </mc:Choice>
+    <mc:Fallback>
+      <p:transition xmlns:p14="http://schemas.microsoft.com/office/powerpoint/2010/main" spd="med">
+        <p:fade/>
+      </p:transition>
+    </mc:Fallback>
+  </mc:AlternateContent>
   <p:timing>
     <p:tnLst>
       <p:par>
@@ -10062,6 +10074,18 @@
   <p:clrMapOvr>
     <a:masterClrMapping/>
   </p:clrMapOvr>
+  <mc:AlternateContent xmlns:mc="http://schemas.openxmlformats.org/markup-compatibility/2006">
+    <mc:Choice xmlns:p14="http://schemas.microsoft.com/office/powerpoint/2010/main" Requires="p14">
+      <p:transition spd="med" p14:dur="700">
+        <p:fade/>
+      </p:transition>
+    </mc:Choice>
+    <mc:Fallback>
+      <p:transition xmlns:p14="http://schemas.microsoft.com/office/powerpoint/2010/main" spd="med">
+        <p:fade/>
+      </p:transition>
+    </mc:Fallback>
+  </mc:AlternateContent>
   <p:timing>
     <p:tnLst>
       <p:par>
@@ -12051,7 +12075,7 @@
           <a:graphicData uri="http://schemas.openxmlformats.org/presentationml/2006/ole">
             <mc:AlternateContent xmlns:mc="http://schemas.openxmlformats.org/markup-compatibility/2006">
               <mc:Choice xmlns:v="urn:schemas-microsoft-com:vml" Requires="v">
-                <p:oleObj spid="_x0000_s47150" name="Equation" r:id="rId3" imgW="2273300" imgH="469900" progId="Equation.DSMT4">
+                <p:oleObj spid="_x0000_s47153" name="Equation" r:id="rId3" imgW="2273300" imgH="469900" progId="Equation.DSMT4">
                   <p:embed/>
                 </p:oleObj>
               </mc:Choice>
@@ -12271,7 +12295,7 @@
           <a:graphicData uri="http://schemas.openxmlformats.org/presentationml/2006/ole">
             <mc:AlternateContent xmlns:mc="http://schemas.openxmlformats.org/markup-compatibility/2006">
               <mc:Choice xmlns:v="urn:schemas-microsoft-com:vml" Requires="v">
-                <p:oleObj spid="_x0000_s47151" name="Equation" r:id="rId5" imgW="2501900" imgH="469900" progId="Equation.DSMT4">
+                <p:oleObj spid="_x0000_s47154" name="Equation" r:id="rId5" imgW="2501900" imgH="469900" progId="Equation.DSMT4">
                   <p:embed/>
                 </p:oleObj>
               </mc:Choice>
@@ -13180,7 +13204,7 @@
           <a:graphicData uri="http://schemas.openxmlformats.org/presentationml/2006/ole">
             <mc:AlternateContent xmlns:mc="http://schemas.openxmlformats.org/markup-compatibility/2006">
               <mc:Choice xmlns:v="urn:schemas-microsoft-com:vml" Requires="v">
-                <p:oleObj spid="_x0000_s50195" name="Equation" r:id="rId3" imgW="2273300" imgH="469900" progId="Equation.DSMT4">
+                <p:oleObj spid="_x0000_s50198" name="Equation" r:id="rId3" imgW="2273300" imgH="469900" progId="Equation.DSMT4">
                   <p:embed/>
                 </p:oleObj>
               </mc:Choice>
@@ -13400,7 +13424,7 @@
           <a:graphicData uri="http://schemas.openxmlformats.org/presentationml/2006/ole">
             <mc:AlternateContent xmlns:mc="http://schemas.openxmlformats.org/markup-compatibility/2006">
               <mc:Choice xmlns:v="urn:schemas-microsoft-com:vml" Requires="v">
-                <p:oleObj spid="_x0000_s50196" name="Equation" r:id="rId5" imgW="2400300" imgH="469900" progId="Equation.DSMT4">
+                <p:oleObj spid="_x0000_s50199" name="Equation" r:id="rId5" imgW="2400300" imgH="469900" progId="Equation.DSMT4">
                   <p:embed/>
                 </p:oleObj>
               </mc:Choice>
@@ -13648,7 +13672,7 @@
           <a:graphicData uri="http://schemas.openxmlformats.org/presentationml/2006/ole">
             <mc:AlternateContent xmlns:mc="http://schemas.openxmlformats.org/markup-compatibility/2006">
               <mc:Choice xmlns:v="urn:schemas-microsoft-com:vml" Requires="v">
-                <p:oleObj spid="_x0000_s48222" name="Equation" r:id="rId3" imgW="2235200" imgH="469900" progId="Equation.DSMT4">
+                <p:oleObj spid="_x0000_s48228" name="Equation" r:id="rId3" imgW="2235200" imgH="469900" progId="Equation.DSMT4">
                   <p:embed/>
                 </p:oleObj>
               </mc:Choice>
@@ -13779,7 +13803,7 @@
           <a:graphicData uri="http://schemas.openxmlformats.org/presentationml/2006/ole">
             <mc:AlternateContent xmlns:mc="http://schemas.openxmlformats.org/markup-compatibility/2006">
               <mc:Choice xmlns:v="urn:schemas-microsoft-com:vml" Requires="v">
-                <p:oleObj spid="_x0000_s48223" name="Equation" r:id="rId5" imgW="2451100" imgH="228600" progId="Equation.DSMT4">
+                <p:oleObj spid="_x0000_s48229" name="Equation" r:id="rId5" imgW="2451100" imgH="228600" progId="Equation.DSMT4">
                   <p:embed/>
                 </p:oleObj>
               </mc:Choice>
@@ -13833,22 +13857,28 @@
           <p:cNvGraphicFramePr>
             <a:graphicFrameLocks noChangeAspect="1"/>
           </p:cNvGraphicFramePr>
-          <p:nvPr/>
+          <p:nvPr>
+            <p:extLst>
+              <p:ext uri="{D42A27DB-BD31-4B8C-83A1-F6EECF244321}">
+                <p14:modId xmlns:p14="http://schemas.microsoft.com/office/powerpoint/2010/main" val="343876205"/>
+              </p:ext>
+            </p:extLst>
+          </p:nvPr>
         </p:nvGraphicFramePr>
         <p:xfrm>
-          <a:off x="328613" y="3446793"/>
-          <a:ext cx="4167187" cy="1543050"/>
+          <a:off x="369888" y="3446463"/>
+          <a:ext cx="4083050" cy="1543050"/>
         </p:xfrm>
         <a:graphic>
           <a:graphicData uri="http://schemas.openxmlformats.org/presentationml/2006/ole">
             <mc:AlternateContent xmlns:mc="http://schemas.openxmlformats.org/markup-compatibility/2006">
               <mc:Choice xmlns:v="urn:schemas-microsoft-com:vml" Requires="v">
-                <p:oleObj spid="_x0000_s48224" name="Equation" r:id="rId7" imgW="1270000" imgH="469900" progId="Equation.DSMT4">
+                <p:oleObj spid="_x0000_s48230" name="Equation" r:id="rId7" imgW="1244600" imgH="469900" progId="Equation.DSMT4">
                   <p:embed/>
                 </p:oleObj>
               </mc:Choice>
               <mc:Fallback>
-                <p:oleObj name="Equation" r:id="rId7" imgW="1270000" imgH="469900" progId="Equation.DSMT4">
+                <p:oleObj name="Equation" r:id="rId7" imgW="1244600" imgH="469900" progId="Equation.DSMT4">
                   <p:embed/>
                   <p:pic>
                     <p:nvPicPr>
@@ -13859,13 +13889,7 @@
                       <p:nvPr/>
                     </p:nvPicPr>
                     <p:blipFill>
-                      <a:blip r:embed="rId8">
-                        <a:extLst>
-                          <a:ext uri="{28A0092B-C50C-407E-A947-70E740481C1C}">
-                            <a14:useLocalDpi xmlns:a14="http://schemas.microsoft.com/office/drawing/2010/main" val="0"/>
-                          </a:ext>
-                        </a:extLst>
-                      </a:blip>
+                      <a:blip r:embed="rId8"/>
                       <a:srcRect/>
                       <a:stretch>
                         <a:fillRect/>
@@ -13873,8 +13897,8 @@
                     </p:blipFill>
                     <p:spPr bwMode="auto">
                       <a:xfrm>
-                        <a:off x="328613" y="3446793"/>
-                        <a:ext cx="4167187" cy="1543050"/>
+                        <a:off x="369888" y="3446463"/>
+                        <a:ext cx="4083050" cy="1543050"/>
                       </a:xfrm>
                       <a:prstGeom prst="rect">
                         <a:avLst/>
@@ -13913,7 +13937,7 @@
           <a:graphicData uri="http://schemas.openxmlformats.org/presentationml/2006/ole">
             <mc:AlternateContent xmlns:mc="http://schemas.openxmlformats.org/markup-compatibility/2006">
               <mc:Choice xmlns:v="urn:schemas-microsoft-com:vml" Requires="v">
-                <p:oleObj spid="_x0000_s48225" name="Equation" r:id="rId9" imgW="711200" imgH="469900" progId="Equation.DSMT4">
+                <p:oleObj spid="_x0000_s48231" name="Equation" r:id="rId9" imgW="711200" imgH="469900" progId="Equation.DSMT4">
                   <p:embed/>
                 </p:oleObj>
               </mc:Choice>
@@ -14104,7 +14128,7 @@
           <a:graphicData uri="http://schemas.openxmlformats.org/presentationml/2006/ole">
             <mc:AlternateContent xmlns:mc="http://schemas.openxmlformats.org/markup-compatibility/2006">
               <mc:Choice xmlns:v="urn:schemas-microsoft-com:vml" Requires="v">
-                <p:oleObj spid="_x0000_s48226" name="Equation" r:id="rId11" imgW="660400" imgH="469900" progId="Equation.DSMT4">
+                <p:oleObj spid="_x0000_s48232" name="Equation" r:id="rId11" imgW="660400" imgH="469900" progId="Equation.DSMT4">
                   <p:embed/>
                 </p:oleObj>
               </mc:Choice>
@@ -14731,7 +14755,7 @@
           <a:graphicData uri="http://schemas.openxmlformats.org/presentationml/2006/ole">
             <mc:AlternateContent xmlns:mc="http://schemas.openxmlformats.org/markup-compatibility/2006">
               <mc:Choice xmlns:v="urn:schemas-microsoft-com:vml" Requires="v">
-                <p:oleObj spid="_x0000_s36953" name="Equation" r:id="rId4" imgW="838200" imgH="215900" progId="Equation.DSMT4">
+                <p:oleObj spid="_x0000_s36959" name="Equation" r:id="rId4" imgW="838200" imgH="215900" progId="Equation.DSMT4">
                   <p:embed/>
                 </p:oleObj>
               </mc:Choice>
@@ -14801,7 +14825,7 @@
           <a:graphicData uri="http://schemas.openxmlformats.org/presentationml/2006/ole">
             <mc:AlternateContent xmlns:mc="http://schemas.openxmlformats.org/markup-compatibility/2006">
               <mc:Choice xmlns:v="urn:schemas-microsoft-com:vml" Requires="v">
-                <p:oleObj spid="_x0000_s36954" name="Equation" r:id="rId6" imgW="114300" imgH="165100" progId="Equation.DSMT4">
+                <p:oleObj spid="_x0000_s36960" name="Equation" r:id="rId6" imgW="114300" imgH="165100" progId="Equation.DSMT4">
                   <p:embed/>
                 </p:oleObj>
               </mc:Choice>
@@ -14871,7 +14895,7 @@
           <a:graphicData uri="http://schemas.openxmlformats.org/presentationml/2006/ole">
             <mc:AlternateContent xmlns:mc="http://schemas.openxmlformats.org/markup-compatibility/2006">
               <mc:Choice xmlns:v="urn:schemas-microsoft-com:vml" Requires="v">
-                <p:oleObj spid="_x0000_s36955" name="Equation" r:id="rId8" imgW="1663700" imgH="342900" progId="Equation.DSMT4">
+                <p:oleObj spid="_x0000_s36961" name="Equation" r:id="rId8" imgW="1663700" imgH="342900" progId="Equation.DSMT4">
                   <p:embed/>
                 </p:oleObj>
               </mc:Choice>
@@ -14941,7 +14965,7 @@
           <a:graphicData uri="http://schemas.openxmlformats.org/presentationml/2006/ole">
             <mc:AlternateContent xmlns:mc="http://schemas.openxmlformats.org/markup-compatibility/2006">
               <mc:Choice xmlns:v="urn:schemas-microsoft-com:vml" Requires="v">
-                <p:oleObj spid="_x0000_s36956" name="Equation" r:id="rId10" imgW="419100" imgH="190500" progId="Equation.DSMT4">
+                <p:oleObj spid="_x0000_s36962" name="Equation" r:id="rId10" imgW="419100" imgH="190500" progId="Equation.DSMT4">
                   <p:embed/>
                 </p:oleObj>
               </mc:Choice>
@@ -15011,7 +15035,7 @@
           <a:graphicData uri="http://schemas.openxmlformats.org/presentationml/2006/ole">
             <mc:AlternateContent xmlns:mc="http://schemas.openxmlformats.org/markup-compatibility/2006">
               <mc:Choice xmlns:v="urn:schemas-microsoft-com:vml" Requires="v">
-                <p:oleObj spid="_x0000_s36957" name="Equation" r:id="rId12" imgW="368300" imgH="190500" progId="Equation.DSMT4">
+                <p:oleObj spid="_x0000_s36963" name="Equation" r:id="rId12" imgW="368300" imgH="190500" progId="Equation.DSMT4">
                   <p:embed/>
                 </p:oleObj>
               </mc:Choice>
@@ -15653,7 +15677,18 @@
   <p:clrMapOvr>
     <a:masterClrMapping/>
   </p:clrMapOvr>
-  <p:transition xmlns:p14="http://schemas.microsoft.com/office/powerpoint/2010/main"/>
+  <mc:AlternateContent xmlns:mc="http://schemas.openxmlformats.org/markup-compatibility/2006">
+    <mc:Choice xmlns:p14="http://schemas.microsoft.com/office/powerpoint/2010/main" Requires="p14">
+      <p:transition p14:dur="100">
+        <p:cut/>
+      </p:transition>
+    </mc:Choice>
+    <mc:Fallback>
+      <p:transition xmlns:p14="http://schemas.microsoft.com/office/powerpoint/2010/main">
+        <p:cut/>
+      </p:transition>
+    </mc:Fallback>
+  </mc:AlternateContent>
   <p:timing>
     <p:tnLst>
       <p:par>
@@ -16907,7 +16942,7 @@
             <a:graphicData uri="http://schemas.openxmlformats.org/presentationml/2006/ole">
               <mc:AlternateContent xmlns:mc="http://schemas.openxmlformats.org/markup-compatibility/2006">
                 <mc:Choice xmlns:v="urn:schemas-microsoft-com:vml" Requires="v">
-                  <p:oleObj spid="_x0000_s1066" name="Equation" r:id="rId4" imgW="558720" imgH="419040" progId="Equation.DSMT4">
+                  <p:oleObj spid="_x0000_s1069" name="Equation" r:id="rId4" imgW="558720" imgH="419040" progId="Equation.DSMT4">
                     <p:embed/>
                   </p:oleObj>
                 </mc:Choice>
@@ -16978,7 +17013,7 @@
           <a:graphicData uri="http://schemas.openxmlformats.org/presentationml/2006/ole">
             <mc:AlternateContent xmlns:mc="http://schemas.openxmlformats.org/markup-compatibility/2006">
               <mc:Choice xmlns:v="urn:schemas-microsoft-com:vml" Requires="v">
-                <p:oleObj spid="_x0000_s1067" name="Equation" r:id="rId6" imgW="241200" imgH="215640" progId="Equation.DSMT4">
+                <p:oleObj spid="_x0000_s1070" name="Equation" r:id="rId6" imgW="241200" imgH="215640" progId="Equation.DSMT4">
                   <p:embed/>
                 </p:oleObj>
               </mc:Choice>
@@ -17228,8 +17263,8 @@
   <p:clrMapOvr>
     <a:masterClrMapping/>
   </p:clrMapOvr>
-  <p:transition xmlns:p14="http://schemas.microsoft.com/office/powerpoint/2010/main">
-    <p:dissolve/>
+  <p:transition xmlns:p14="http://schemas.microsoft.com/office/powerpoint/2010/main" spd="slow">
+    <p:fade thruBlk="1"/>
   </p:transition>
   <p:timing>
     <p:tnLst>
@@ -17553,7 +17588,7 @@
           <a:graphicData uri="http://schemas.openxmlformats.org/presentationml/2006/ole">
             <mc:AlternateContent xmlns:mc="http://schemas.openxmlformats.org/markup-compatibility/2006">
               <mc:Choice xmlns:v="urn:schemas-microsoft-com:vml" Requires="v">
-                <p:oleObj spid="_x0000_s2092" name="Equation" r:id="rId4" imgW="596880" imgH="419040" progId="Equation.DSMT4">
+                <p:oleObj spid="_x0000_s2095" name="Equation" r:id="rId4" imgW="596880" imgH="419040" progId="Equation.DSMT4">
                   <p:embed/>
                 </p:oleObj>
               </mc:Choice>
@@ -17751,7 +17786,7 @@
           <a:graphicData uri="http://schemas.openxmlformats.org/presentationml/2006/ole">
             <mc:AlternateContent xmlns:mc="http://schemas.openxmlformats.org/markup-compatibility/2006">
               <mc:Choice xmlns:v="urn:schemas-microsoft-com:vml" Requires="v">
-                <p:oleObj spid="_x0000_s2093" name="Equation" r:id="rId6" imgW="863280" imgH="558720" progId="Equation.DSMT4">
+                <p:oleObj spid="_x0000_s2096" name="Equation" r:id="rId6" imgW="863280" imgH="558720" progId="Equation.DSMT4">
                   <p:embed/>
                 </p:oleObj>
               </mc:Choice>
@@ -17989,7 +18024,18 @@
   <p:clrMapOvr>
     <a:masterClrMapping/>
   </p:clrMapOvr>
-  <p:transition xmlns:p14="http://schemas.microsoft.com/office/powerpoint/2010/main"/>
+  <mc:AlternateContent xmlns:mc="http://schemas.openxmlformats.org/markup-compatibility/2006">
+    <mc:Choice xmlns:p14="http://schemas.microsoft.com/office/powerpoint/2010/main" Requires="p14">
+      <p:transition spd="med" p14:dur="700">
+        <p:fade/>
+      </p:transition>
+    </mc:Choice>
+    <mc:Fallback>
+      <p:transition xmlns:p14="http://schemas.microsoft.com/office/powerpoint/2010/main" spd="med">
+        <p:fade/>
+      </p:transition>
+    </mc:Fallback>
+  </mc:AlternateContent>
   <p:timing>
     <p:tnLst>
       <p:par>
@@ -18390,7 +18436,7 @@
           <a:graphicData uri="http://schemas.openxmlformats.org/presentationml/2006/ole">
             <mc:AlternateContent xmlns:mc="http://schemas.openxmlformats.org/markup-compatibility/2006">
               <mc:Choice xmlns:v="urn:schemas-microsoft-com:vml" Requires="v">
-                <p:oleObj spid="_x0000_s4123" name="Equation" r:id="rId4" imgW="596880" imgH="419040" progId="Equation.DSMT4">
+                <p:oleObj spid="_x0000_s4125" name="Equation" r:id="rId4" imgW="596880" imgH="419040" progId="Equation.DSMT4">
                   <p:embed/>
                 </p:oleObj>
               </mc:Choice>
@@ -18720,6 +18766,18 @@
   <p:clrMapOvr>
     <a:masterClrMapping/>
   </p:clrMapOvr>
+  <mc:AlternateContent xmlns:mc="http://schemas.openxmlformats.org/markup-compatibility/2006">
+    <mc:Choice xmlns:p14="http://schemas.microsoft.com/office/powerpoint/2010/main" Requires="p14">
+      <p:transition spd="med" p14:dur="700">
+        <p:fade thruBlk="1"/>
+      </p:transition>
+    </mc:Choice>
+    <mc:Fallback>
+      <p:transition xmlns:p14="http://schemas.microsoft.com/office/powerpoint/2010/main" spd="med">
+        <p:fade thruBlk="1"/>
+      </p:transition>
+    </mc:Fallback>
+  </mc:AlternateContent>
   <p:timing>
     <p:tnLst>
       <p:par>

</xml_diff>